<commit_message>
adição da referência: Microsoft. Unit test your code.
</commit_message>
<xml_diff>
--- a/unit-tests.pptx
+++ b/unit-tests.pptx
@@ -4543,9 +4543,46 @@
               <a:buAutoNum type="arabicPeriod"/>
             </a:pPr>
             <a:r>
+              <a:rPr lang="pt-BR" dirty="0" smtClean="0"/>
+              <a:t>Microsoft</a:t>
+            </a:r>
+            <a:r>
               <a:rPr lang="pt-BR" dirty="0"/>
-              <a:t>http://testesdesoftware.com/teste-de-caixa-branca/</a:t>
-            </a:r>
+              <a:t>. </a:t>
+            </a:r>
+            <a:r>
+              <a:rPr lang="pt-BR" b="1" dirty="0"/>
+              <a:t>Noções básicas de teste de </a:t>
+            </a:r>
+            <a:r>
+              <a:rPr lang="pt-BR" b="1" dirty="0" smtClean="0"/>
+              <a:t>unidade</a:t>
+            </a:r>
+            <a:r>
+              <a:rPr lang="pt-BR" dirty="0" smtClean="0"/>
+              <a:t>. </a:t>
+            </a:r>
+            <a:r>
+              <a:rPr lang="pt-BR" u="sng" dirty="0" smtClean="0"/>
+              <a:t>Disponível</a:t>
+            </a:r>
+            <a:r>
+              <a:rPr lang="pt-BR" dirty="0" smtClean="0"/>
+              <a:t> em: </a:t>
+            </a:r>
+            <a:r>
+              <a:rPr lang="pt-BR" dirty="0">
+                <a:hlinkClick r:id="rId3"/>
+              </a:rPr>
+              <a:t>https://</a:t>
+            </a:r>
+            <a:r>
+              <a:rPr lang="pt-BR" dirty="0" smtClean="0">
+                <a:hlinkClick r:id="rId3"/>
+              </a:rPr>
+              <a:t>docs.microsoft.com/pt-br/visualstudio/test/unit-test-basics?view=vs-2019</a:t>
+            </a:r>
+            <a:endParaRPr lang="pt-BR" dirty="0" smtClean="0"/>
           </a:p>
           <a:p>
             <a:pPr marL="514350" indent="-514350" algn="l">
@@ -4553,65 +4590,52 @@
               <a:buAutoNum type="arabicPeriod"/>
             </a:pPr>
             <a:r>
-              <a:rPr lang="pt-BR" dirty="0" smtClean="0">
-                <a:hlinkClick r:id="rId3"/>
-              </a:rPr>
-              <a:t>http</a:t>
-            </a:r>
-            <a:r>
-              <a:rPr lang="pt-BR" dirty="0">
-                <a:hlinkClick r:id="rId3"/>
-              </a:rPr>
-              <a:t>://</a:t>
-            </a:r>
-            <a:r>
-              <a:rPr lang="pt-BR" dirty="0" smtClean="0">
-                <a:hlinkClick r:id="rId3"/>
-              </a:rPr>
-              <a:t>testesdesoftware.com/teste-de-unidade</a:t>
-            </a:r>
-            <a:r>
-              <a:rPr lang="pt-BR" dirty="0" smtClean="0">
-                <a:hlinkClick r:id="rId3"/>
-              </a:rPr>
-              <a:t>/</a:t>
-            </a:r>
-            <a:endParaRPr lang="pt-BR" dirty="0" smtClean="0"/>
-          </a:p>
-          <a:p>
-            <a:pPr marL="514350" indent="-514350" algn="l">
-              <a:buFont typeface="+mj-lt"/>
-              <a:buAutoNum type="arabicPeriod"/>
-            </a:pPr>
-            <a:r>
               <a:rPr lang="pt-BR" dirty="0"/>
               <a:t>Microsoft. </a:t>
             </a:r>
             <a:r>
               <a:rPr lang="pt-BR" b="1" dirty="0"/>
-              <a:t>Noções básicas de teste de </a:t>
-            </a:r>
-            <a:r>
-              <a:rPr lang="pt-BR" b="1" dirty="0" smtClean="0"/>
-              <a:t>unidade</a:t>
+              <a:t>Unit </a:t>
+            </a:r>
+            <a:r>
+              <a:rPr lang="pt-BR" b="1" dirty="0" err="1"/>
+              <a:t>test</a:t>
+            </a:r>
+            <a:r>
+              <a:rPr lang="pt-BR" b="1" dirty="0"/>
+              <a:t> </a:t>
+            </a:r>
+            <a:r>
+              <a:rPr lang="pt-BR" b="1" dirty="0" err="1"/>
+              <a:t>your</a:t>
+            </a:r>
+            <a:r>
+              <a:rPr lang="pt-BR" b="1" dirty="0"/>
+              <a:t> </a:t>
+            </a:r>
+            <a:r>
+              <a:rPr lang="pt-BR" b="1" dirty="0" err="1" smtClean="0"/>
+              <a:t>code</a:t>
             </a:r>
             <a:r>
               <a:rPr lang="pt-BR" dirty="0" smtClean="0"/>
               <a:t>. </a:t>
             </a:r>
             <a:r>
-              <a:rPr lang="pt-BR" u="sng" dirty="0" smtClean="0"/>
-              <a:t>Disponível</a:t>
-            </a:r>
-            <a:r>
-              <a:rPr lang="pt-BR" dirty="0" smtClean="0"/>
-              <a:t> em: </a:t>
+              <a:rPr lang="pt-BR" dirty="0"/>
+              <a:t>Disponível em: </a:t>
             </a:r>
             <a:r>
               <a:rPr lang="pt-BR" dirty="0">
                 <a:hlinkClick r:id="rId4"/>
               </a:rPr>
-              <a:t>https://docs.microsoft.com/pt-br/visualstudio/test/unit-test-basics?view=vs-2019</a:t>
+              <a:t>https://</a:t>
+            </a:r>
+            <a:r>
+              <a:rPr lang="pt-BR" dirty="0" smtClean="0">
+                <a:hlinkClick r:id="rId4"/>
+              </a:rPr>
+              <a:t>docs.microsoft.com/en-us/visualstudio/test/unit-test-your-code?view=vs-2019</a:t>
             </a:r>
             <a:endParaRPr lang="pt-BR" dirty="0" smtClean="0"/>
           </a:p>

</xml_diff>